<commit_message>
Finalised saving to file of edited dialogue. Edited dialogue can now be loaded and saved correctly between sessions.
</commit_message>
<xml_diff>
--- a/Docs/ShowcaseSlide.pptx
+++ b/Docs/ShowcaseSlide.pptx
@@ -197,7 +197,7 @@
           <a:p>
             <a:fld id="{C452ADB1-275D-430A-89EE-5C7E6CFF6FF2}" type="datetimeFigureOut">
               <a:rPr lang="en-US" smtClean="0"/>
-              <a:t>4/18/2023</a:t>
+              <a:t>4/19/2023</a:t>
             </a:fld>
             <a:endParaRPr lang="en-US" dirty="0"/>
           </a:p>
@@ -9257,7 +9257,7 @@
           <a:p>
             <a:fld id="{7005E26E-BCB2-4FD5-8FD5-81A5EAE94C21}" type="datetime1">
               <a:rPr lang="en-US" smtClean="0"/>
-              <a:t>4/18/2023</a:t>
+              <a:t>4/19/2023</a:t>
             </a:fld>
             <a:endParaRPr lang="en-US" dirty="0"/>
           </a:p>
@@ -9459,7 +9459,7 @@
           <a:p>
             <a:fld id="{9CC2E9B8-0487-42E4-B571-744A3D775783}" type="datetime1">
               <a:rPr lang="en-US" smtClean="0"/>
-              <a:t>4/18/2023</a:t>
+              <a:t>4/19/2023</a:t>
             </a:fld>
             <a:endParaRPr lang="en-US" dirty="0"/>
           </a:p>
@@ -9634,7 +9634,7 @@
           <a:p>
             <a:fld id="{9052E32D-1E84-43FD-8158-FFFE757EB0E8}" type="datetime1">
               <a:rPr lang="en-US" smtClean="0"/>
-              <a:t>4/18/2023</a:t>
+              <a:t>4/19/2023</a:t>
             </a:fld>
             <a:endParaRPr lang="en-US" dirty="0"/>
           </a:p>
@@ -9834,7 +9834,7 @@
           <a:p>
             <a:fld id="{8585C470-CD19-455C-B830-6D252EAD7FE5}" type="datetime1">
               <a:rPr lang="en-US" smtClean="0"/>
-              <a:t>4/18/2023</a:t>
+              <a:t>4/19/2023</a:t>
             </a:fld>
             <a:endParaRPr lang="en-US" dirty="0"/>
           </a:p>
@@ -18727,7 +18727,7 @@
           <a:p>
             <a:fld id="{7F85C43C-50D9-4F49-A136-0EFF292F93ED}" type="datetime1">
               <a:rPr lang="en-US" smtClean="0"/>
-              <a:t>4/18/2023</a:t>
+              <a:t>4/19/2023</a:t>
             </a:fld>
             <a:endParaRPr lang="en-US" dirty="0"/>
           </a:p>
@@ -18996,7 +18996,7 @@
           <a:p>
             <a:fld id="{7B53B1A3-0AEF-4064-A724-D27D660C8653}" type="datetime1">
               <a:rPr lang="en-US" smtClean="0"/>
-              <a:t>4/18/2023</a:t>
+              <a:t>4/19/2023</a:t>
             </a:fld>
             <a:endParaRPr lang="en-US" dirty="0"/>
           </a:p>
@@ -19389,7 +19389,7 @@
           <a:p>
             <a:fld id="{37D5D0F2-BF66-4A24-9384-A0129B196518}" type="datetime1">
               <a:rPr lang="en-US" smtClean="0"/>
-              <a:t>4/18/2023</a:t>
+              <a:t>4/19/2023</a:t>
             </a:fld>
             <a:endParaRPr lang="en-US" dirty="0"/>
           </a:p>
@@ -19502,7 +19502,7 @@
           <a:p>
             <a:fld id="{8C318A6C-4F6B-48D2-BDB0-D7413B3FDB0A}" type="datetime1">
               <a:rPr lang="en-US" smtClean="0"/>
-              <a:t>4/18/2023</a:t>
+              <a:t>4/19/2023</a:t>
             </a:fld>
             <a:endParaRPr lang="en-US" dirty="0"/>
           </a:p>
@@ -19592,7 +19592,7 @@
           <a:p>
             <a:fld id="{BF01ECED-6ECE-4989-B917-9D4D7E6D3C76}" type="datetime1">
               <a:rPr lang="en-US" smtClean="0"/>
-              <a:t>4/18/2023</a:t>
+              <a:t>4/19/2023</a:t>
             </a:fld>
             <a:endParaRPr lang="en-US" dirty="0"/>
           </a:p>
@@ -19877,7 +19877,7 @@
           <a:p>
             <a:fld id="{E3B570E1-CB40-488E-8C6F-EF4211DFFCB0}" type="datetime1">
               <a:rPr lang="en-US" smtClean="0"/>
-              <a:t>4/18/2023</a:t>
+              <a:t>4/19/2023</a:t>
             </a:fld>
             <a:endParaRPr lang="en-US" dirty="0"/>
           </a:p>
@@ -20152,7 +20152,7 @@
           <a:p>
             <a:fld id="{D1CEB6AF-9F5C-43BE-879E-CB9514111250}" type="datetime1">
               <a:rPr lang="en-US" smtClean="0"/>
-              <a:t>4/18/2023</a:t>
+              <a:t>4/19/2023</a:t>
             </a:fld>
             <a:endParaRPr lang="en-US" dirty="0"/>
           </a:p>
@@ -20397,7 +20397,7 @@
           <a:p>
             <a:fld id="{E7EE424C-FCA3-4EDD-B274-8E055D649B7D}" type="datetime1">
               <a:rPr lang="en-US" smtClean="0"/>
-              <a:t>4/18/2023</a:t>
+              <a:t>4/19/2023</a:t>
             </a:fld>
             <a:endParaRPr lang="en-US" dirty="0"/>
           </a:p>
@@ -21375,7 +21375,15 @@
           <a:p>
             <a:r>
               <a:rPr lang="pl-PL" dirty="0"/>
-              <a:t>Dialogue Tale is a runtime Dialogue Editor in Unity. It allows a Unity user to easily CREATE and EDIT Dialogue Trees belonging to various differect characters. </a:t>
+              <a:t>Dialogue Tale is a runtime Dialogue Editor in Unity. It allows a Unity user to easily CREATE and EDIT Dialogue Trees belonging to various differe</a:t>
+            </a:r>
+            <a:r>
+              <a:rPr lang="en-IE" dirty="0"/>
+              <a:t>n</a:t>
+            </a:r>
+            <a:r>
+              <a:rPr lang="pl-PL" dirty="0"/>
+              <a:t>t characters. </a:t>
             </a:r>
             <a:endParaRPr lang="en-IE" dirty="0"/>
           </a:p>
@@ -21403,7 +21411,11 @@
           <a:p>
             <a:r>
               <a:rPr lang="en-US" dirty="0"/>
-              <a:t>Once a Dialogue is created, it can be applied to any character in the project. All that is required is the character name. The system matches up the character name with the character in the scene and automatically assigns the dialogue to that character</a:t>
+              <a:t>Once a Dialogue is created, it can be applied to any character in the project. All that is required is the character name. The system matches up the character name with the character in the scene and automatically assigns the dialogue to that character. I have created a template scene to showcase and test this feature to assist the user in understanding </a:t>
+            </a:r>
+            <a:r>
+              <a:rPr lang="en-US"/>
+              <a:t>the system.</a:t>
             </a:r>
             <a:endParaRPr lang="en-US" sz="2800" dirty="0">
               <a:latin typeface="Arial Rounded MT Bold" panose="020F0704030504030204" pitchFamily="34" charset="0"/>
@@ -21413,6 +21425,154 @@
             <a:pPr algn="ctr"/>
             <a:endParaRPr lang="en-IE" sz="3600" dirty="0">
               <a:latin typeface="Arial Rounded MT Bold" panose="020F0704030504030204" pitchFamily="34" charset="0"/>
+            </a:endParaRPr>
+          </a:p>
+        </p:txBody>
+      </p:sp>
+      <p:pic>
+        <p:nvPicPr>
+          <p:cNvPr id="7" name="Picture 6" descr="Graphical user interface, website&#10;&#10;Description automatically generated">
+            <a:extLst>
+              <a:ext uri="{FF2B5EF4-FFF2-40B4-BE49-F238E27FC236}">
+                <a16:creationId xmlns:a16="http://schemas.microsoft.com/office/drawing/2014/main" id="{CDB4691E-A6EB-852C-0696-DC016789C149}"/>
+              </a:ext>
+            </a:extLst>
+          </p:cNvPr>
+          <p:cNvPicPr>
+            <a:picLocks noChangeAspect="1"/>
+          </p:cNvPicPr>
+          <p:nvPr/>
+        </p:nvPicPr>
+        <p:blipFill>
+          <a:blip r:embed="rId3"/>
+          <a:stretch>
+            <a:fillRect/>
+          </a:stretch>
+        </p:blipFill>
+        <p:spPr>
+          <a:xfrm>
+            <a:off x="758726" y="4480718"/>
+            <a:ext cx="3129566" cy="1725519"/>
+          </a:xfrm>
+          <a:prstGeom prst="rect">
+            <a:avLst/>
+          </a:prstGeom>
+        </p:spPr>
+      </p:pic>
+      <p:pic>
+        <p:nvPicPr>
+          <p:cNvPr id="11" name="Picture 10" descr="Graphical user interface, text&#10;&#10;Description automatically generated">
+            <a:extLst>
+              <a:ext uri="{FF2B5EF4-FFF2-40B4-BE49-F238E27FC236}">
+                <a16:creationId xmlns:a16="http://schemas.microsoft.com/office/drawing/2014/main" id="{3E5DFC7A-922A-CB0D-F608-F5B5DDBEC6A4}"/>
+              </a:ext>
+            </a:extLst>
+          </p:cNvPr>
+          <p:cNvPicPr>
+            <a:picLocks noChangeAspect="1"/>
+          </p:cNvPicPr>
+          <p:nvPr/>
+        </p:nvPicPr>
+        <p:blipFill>
+          <a:blip r:embed="rId4"/>
+          <a:stretch>
+            <a:fillRect/>
+          </a:stretch>
+        </p:blipFill>
+        <p:spPr>
+          <a:xfrm>
+            <a:off x="6216725" y="4480718"/>
+            <a:ext cx="3152556" cy="1725517"/>
+          </a:xfrm>
+          <a:prstGeom prst="rect">
+            <a:avLst/>
+          </a:prstGeom>
+        </p:spPr>
+      </p:pic>
+      <p:sp>
+        <p:nvSpPr>
+          <p:cNvPr id="12" name="TextBox 11">
+            <a:extLst>
+              <a:ext uri="{FF2B5EF4-FFF2-40B4-BE49-F238E27FC236}">
+                <a16:creationId xmlns:a16="http://schemas.microsoft.com/office/drawing/2014/main" id="{22D44BDA-CF91-EB9A-B12B-28A328F15FB1}"/>
+              </a:ext>
+            </a:extLst>
+          </p:cNvPr>
+          <p:cNvSpPr txBox="1"/>
+          <p:nvPr/>
+        </p:nvSpPr>
+        <p:spPr>
+          <a:xfrm>
+            <a:off x="4004952" y="4403736"/>
+            <a:ext cx="1529020" cy="646331"/>
+          </a:xfrm>
+          <a:prstGeom prst="rect">
+            <a:avLst/>
+          </a:prstGeom>
+          <a:noFill/>
+        </p:spPr>
+        <p:txBody>
+          <a:bodyPr wrap="square" rtlCol="0">
+            <a:spAutoFit/>
+          </a:bodyPr>
+          <a:lstStyle/>
+          <a:p>
+            <a:r>
+              <a:rPr lang="en-IE" dirty="0">
+                <a:solidFill>
+                  <a:schemeClr val="bg1"/>
+                </a:solidFill>
+              </a:rPr>
+              <a:t>Example Dialogue Tree</a:t>
+            </a:r>
+            <a:endParaRPr lang="pl-PL" dirty="0">
+              <a:solidFill>
+                <a:schemeClr val="bg1"/>
+              </a:solidFill>
+            </a:endParaRPr>
+          </a:p>
+        </p:txBody>
+      </p:sp>
+      <p:sp>
+        <p:nvSpPr>
+          <p:cNvPr id="15" name="TextBox 14">
+            <a:extLst>
+              <a:ext uri="{FF2B5EF4-FFF2-40B4-BE49-F238E27FC236}">
+                <a16:creationId xmlns:a16="http://schemas.microsoft.com/office/drawing/2014/main" id="{512719FC-7FC0-D51B-CDB9-EA4D9485FC67}"/>
+              </a:ext>
+            </a:extLst>
+          </p:cNvPr>
+          <p:cNvSpPr txBox="1"/>
+          <p:nvPr/>
+        </p:nvSpPr>
+        <p:spPr>
+          <a:xfrm>
+            <a:off x="9485941" y="4403736"/>
+            <a:ext cx="1436183" cy="646331"/>
+          </a:xfrm>
+          <a:prstGeom prst="rect">
+            <a:avLst/>
+          </a:prstGeom>
+          <a:noFill/>
+        </p:spPr>
+        <p:txBody>
+          <a:bodyPr wrap="square" rtlCol="0">
+            <a:spAutoFit/>
+          </a:bodyPr>
+          <a:lstStyle/>
+          <a:p>
+            <a:r>
+              <a:rPr lang="en-IE" dirty="0">
+                <a:solidFill>
+                  <a:schemeClr val="bg1"/>
+                </a:solidFill>
+              </a:rPr>
+              <a:t>Edit Existing Dialogues</a:t>
+            </a:r>
+            <a:endParaRPr lang="pl-PL" dirty="0">
+              <a:solidFill>
+                <a:schemeClr val="bg1"/>
+              </a:solidFill>
             </a:endParaRPr>
           </a:p>
         </p:txBody>
@@ -21994,23 +22154,6 @@
 </file>
 
 <file path=customXml/item1.xml><?xml version="1.0" encoding="utf-8"?>
-<p:properties xmlns:p="http://schemas.microsoft.com/office/2006/metadata/properties" xmlns:xsi="http://www.w3.org/2001/XMLSchema-instance" xmlns:pc="http://schemas.microsoft.com/office/infopath/2007/PartnerControls">
-  <documentManagement>
-    <MediaServiceKeyPoints xmlns="71af3243-3dd4-4a8d-8c0d-dd76da1f02a5" xsi:nil="true"/>
-  </documentManagement>
-</p:properties>
-</file>
-
-<file path=customXml/item2.xml><?xml version="1.0" encoding="utf-8"?>
-<?mso-contentType ?>
-<FormTemplates xmlns="http://schemas.microsoft.com/sharepoint/v3/contenttype/forms">
-  <Display>DocumentLibraryForm</Display>
-  <Edit>DocumentLibraryForm</Edit>
-  <New>DocumentLibraryForm</New>
-</FormTemplates>
-</file>
-
-<file path=customXml/item3.xml><?xml version="1.0" encoding="utf-8"?>
 <ct:contentTypeSchema xmlns:ct="http://schemas.microsoft.com/office/2006/metadata/contentType" xmlns:ma="http://schemas.microsoft.com/office/2006/metadata/properties/metaAttributes" ct:_="" ma:_="" ma:contentTypeName="Document" ma:contentTypeID="0x01010079F111ED35F8CC479449609E8A0923A6" ma:contentTypeVersion="11" ma:contentTypeDescription="Create a new document." ma:contentTypeScope="" ma:versionID="9677210f24a1be23c92c90fd886aa0aa">
   <xsd:schema xmlns:xsd="http://www.w3.org/2001/XMLSchema" xmlns:xs="http://www.w3.org/2001/XMLSchema" xmlns:p="http://schemas.microsoft.com/office/2006/metadata/properties" xmlns:ns2="71af3243-3dd4-4a8d-8c0d-dd76da1f02a5" xmlns:ns3="16c05727-aa75-4e4a-9b5f-8a80a1165891" targetNamespace="http://schemas.microsoft.com/office/2006/metadata/properties" ma:root="true" ma:fieldsID="60e05723c5c1908df1a1a4ebf11d344e" ns2:_="" ns3:_="">
     <xsd:import namespace="71af3243-3dd4-4a8d-8c0d-dd76da1f02a5"/>
@@ -22221,25 +22364,24 @@
 </ct:contentTypeSchema>
 </file>
 
-<file path=customXml/itemProps1.xml><?xml version="1.0" encoding="utf-8"?>
-<ds:datastoreItem xmlns:ds="http://schemas.openxmlformats.org/officeDocument/2006/customXml" ds:itemID="{788A2F88-55C5-4ED1-9541-807C65424763}">
-  <ds:schemaRefs>
-    <ds:schemaRef ds:uri="http://schemas.microsoft.com/office/2006/metadata/properties"/>
-    <ds:schemaRef ds:uri="http://schemas.microsoft.com/office/infopath/2007/PartnerControls"/>
-    <ds:schemaRef ds:uri="71af3243-3dd4-4a8d-8c0d-dd76da1f02a5"/>
-  </ds:schemaRefs>
-</ds:datastoreItem>
+<file path=customXml/item2.xml><?xml version="1.0" encoding="utf-8"?>
+<?mso-contentType ?>
+<FormTemplates xmlns="http://schemas.microsoft.com/sharepoint/v3/contenttype/forms">
+  <Display>DocumentLibraryForm</Display>
+  <Edit>DocumentLibraryForm</Edit>
+  <New>DocumentLibraryForm</New>
+</FormTemplates>
 </file>
 
-<file path=customXml/itemProps2.xml><?xml version="1.0" encoding="utf-8"?>
-<ds:datastoreItem xmlns:ds="http://schemas.openxmlformats.org/officeDocument/2006/customXml" ds:itemID="{4F44C90D-2A62-4985-9618-3460247437B1}">
-  <ds:schemaRefs>
-    <ds:schemaRef ds:uri="http://schemas.microsoft.com/sharepoint/v3/contenttype/forms"/>
-  </ds:schemaRefs>
-</ds:datastoreItem>
+<file path=customXml/item3.xml><?xml version="1.0" encoding="utf-8"?>
+<p:properties xmlns:p="http://schemas.microsoft.com/office/2006/metadata/properties" xmlns:xsi="http://www.w3.org/2001/XMLSchema-instance" xmlns:pc="http://schemas.microsoft.com/office/infopath/2007/PartnerControls">
+  <documentManagement>
+    <MediaServiceKeyPoints xmlns="71af3243-3dd4-4a8d-8c0d-dd76da1f02a5" xsi:nil="true"/>
+  </documentManagement>
+</p:properties>
 </file>
 
-<file path=customXml/itemProps3.xml><?xml version="1.0" encoding="utf-8"?>
+<file path=customXml/itemProps1.xml><?xml version="1.0" encoding="utf-8"?>
 <ds:datastoreItem xmlns:ds="http://schemas.openxmlformats.org/officeDocument/2006/customXml" ds:itemID="{B61EAB5F-88FC-4FAE-AE3C-037A3C365EB8}">
   <ds:schemaRefs>
     <ds:schemaRef ds:uri="http://schemas.microsoft.com/office/2006/metadata/contentType"/>
@@ -22256,4 +22398,22 @@
     <ds:schemaRef ds:uri="http://schemas.microsoft.com/internal/obd"/>
   </ds:schemaRefs>
 </ds:datastoreItem>
+</file>
+
+<file path=customXml/itemProps2.xml><?xml version="1.0" encoding="utf-8"?>
+<ds:datastoreItem xmlns:ds="http://schemas.openxmlformats.org/officeDocument/2006/customXml" ds:itemID="{4F44C90D-2A62-4985-9618-3460247437B1}">
+  <ds:schemaRefs>
+    <ds:schemaRef ds:uri="http://schemas.microsoft.com/sharepoint/v3/contenttype/forms"/>
+  </ds:schemaRefs>
+</ds:datastoreItem>
+</file>
+
+<file path=customXml/itemProps3.xml><?xml version="1.0" encoding="utf-8"?>
+<ds:datastoreItem xmlns:ds="http://schemas.openxmlformats.org/officeDocument/2006/customXml" ds:itemID="{788A2F88-55C5-4ED1-9541-807C65424763}">
+  <ds:schemaRefs>
+    <ds:schemaRef ds:uri="http://schemas.microsoft.com/office/2006/metadata/properties"/>
+    <ds:schemaRef ds:uri="http://schemas.microsoft.com/office/infopath/2007/PartnerControls"/>
+    <ds:schemaRef ds:uri="71af3243-3dd4-4a8d-8c0d-dd76da1f02a5"/>
+  </ds:schemaRefs>
+</ds:datastoreItem>
 </file>
</xml_diff>